<commit_message>
Updated ARP-4754 overlay data model based on recent feedback.
</commit_message>
<xml_diff>
--- a/overlays/ARP-4754A/ARP-4754A-ontology.pptx
+++ b/overlays/ARP-4754A/ARP-4754A-ontology.pptx
@@ -198,7 +198,7 @@
           <a:p>
             <a:fld id="{6D02D52E-7427-AC40-BCC5-1EA7CBC30CAB}" type="datetimeFigureOut">
               <a:rPr lang="en-US" smtClean="0"/>
-              <a:t>10/25/23</a:t>
+              <a:t>11/9/23</a:t>
             </a:fld>
             <a:endParaRPr lang="en-US"/>
           </a:p>
@@ -696,7 +696,7 @@
           <a:p>
             <a:fld id="{5D04BAA6-3F2E-F94C-8900-238E37332B13}" type="datetimeFigureOut">
               <a:rPr lang="en-US" smtClean="0"/>
-              <a:t>10/25/23</a:t>
+              <a:t>11/9/23</a:t>
             </a:fld>
             <a:endParaRPr lang="en-US"/>
           </a:p>
@@ -894,7 +894,7 @@
           <a:p>
             <a:fld id="{5D04BAA6-3F2E-F94C-8900-238E37332B13}" type="datetimeFigureOut">
               <a:rPr lang="en-US" smtClean="0"/>
-              <a:t>10/25/23</a:t>
+              <a:t>11/9/23</a:t>
             </a:fld>
             <a:endParaRPr lang="en-US"/>
           </a:p>
@@ -1102,7 +1102,7 @@
           <a:p>
             <a:fld id="{5D04BAA6-3F2E-F94C-8900-238E37332B13}" type="datetimeFigureOut">
               <a:rPr lang="en-US" smtClean="0"/>
-              <a:t>10/25/23</a:t>
+              <a:t>11/9/23</a:t>
             </a:fld>
             <a:endParaRPr lang="en-US"/>
           </a:p>
@@ -1300,7 +1300,7 @@
           <a:p>
             <a:fld id="{5D04BAA6-3F2E-F94C-8900-238E37332B13}" type="datetimeFigureOut">
               <a:rPr lang="en-US" smtClean="0"/>
-              <a:t>10/25/23</a:t>
+              <a:t>11/9/23</a:t>
             </a:fld>
             <a:endParaRPr lang="en-US"/>
           </a:p>
@@ -1575,7 +1575,7 @@
           <a:p>
             <a:fld id="{5D04BAA6-3F2E-F94C-8900-238E37332B13}" type="datetimeFigureOut">
               <a:rPr lang="en-US" smtClean="0"/>
-              <a:t>10/25/23</a:t>
+              <a:t>11/9/23</a:t>
             </a:fld>
             <a:endParaRPr lang="en-US"/>
           </a:p>
@@ -1840,7 +1840,7 @@
           <a:p>
             <a:fld id="{5D04BAA6-3F2E-F94C-8900-238E37332B13}" type="datetimeFigureOut">
               <a:rPr lang="en-US" smtClean="0"/>
-              <a:t>10/25/23</a:t>
+              <a:t>11/9/23</a:t>
             </a:fld>
             <a:endParaRPr lang="en-US"/>
           </a:p>
@@ -2252,7 +2252,7 @@
           <a:p>
             <a:fld id="{5D04BAA6-3F2E-F94C-8900-238E37332B13}" type="datetimeFigureOut">
               <a:rPr lang="en-US" smtClean="0"/>
-              <a:t>10/25/23</a:t>
+              <a:t>11/9/23</a:t>
             </a:fld>
             <a:endParaRPr lang="en-US"/>
           </a:p>
@@ -2393,7 +2393,7 @@
           <a:p>
             <a:fld id="{5D04BAA6-3F2E-F94C-8900-238E37332B13}" type="datetimeFigureOut">
               <a:rPr lang="en-US" smtClean="0"/>
-              <a:t>10/25/23</a:t>
+              <a:t>11/9/23</a:t>
             </a:fld>
             <a:endParaRPr lang="en-US"/>
           </a:p>
@@ -2506,7 +2506,7 @@
           <a:p>
             <a:fld id="{5D04BAA6-3F2E-F94C-8900-238E37332B13}" type="datetimeFigureOut">
               <a:rPr lang="en-US" smtClean="0"/>
-              <a:t>10/25/23</a:t>
+              <a:t>11/9/23</a:t>
             </a:fld>
             <a:endParaRPr lang="en-US"/>
           </a:p>
@@ -2817,7 +2817,7 @@
           <a:p>
             <a:fld id="{5D04BAA6-3F2E-F94C-8900-238E37332B13}" type="datetimeFigureOut">
               <a:rPr lang="en-US" smtClean="0"/>
-              <a:t>10/25/23</a:t>
+              <a:t>11/9/23</a:t>
             </a:fld>
             <a:endParaRPr lang="en-US"/>
           </a:p>
@@ -3105,7 +3105,7 @@
           <a:p>
             <a:fld id="{5D04BAA6-3F2E-F94C-8900-238E37332B13}" type="datetimeFigureOut">
               <a:rPr lang="en-US" smtClean="0"/>
-              <a:t>10/25/23</a:t>
+              <a:t>11/9/23</a:t>
             </a:fld>
             <a:endParaRPr lang="en-US"/>
           </a:p>
@@ -3346,7 +3346,7 @@
           <a:p>
             <a:fld id="{5D04BAA6-3F2E-F94C-8900-238E37332B13}" type="datetimeFigureOut">
               <a:rPr lang="en-US" smtClean="0"/>
-              <a:t>10/25/23</a:t>
+              <a:t>11/9/23</a:t>
             </a:fld>
             <a:endParaRPr lang="en-US"/>
           </a:p>
@@ -4164,7 +4164,7 @@
             <a:pPr algn="ctr"/>
             <a:r>
               <a:rPr lang="en-US" sz="1200" dirty="0"/>
-              <a:t>PROCESS_PLAN: ARP4754_Plan</a:t>
+              <a:t>PLAN: ARP4754_Plan</a:t>
             </a:r>
           </a:p>
         </p:txBody>
@@ -6500,6 +6500,9 @@
           <a:prstGeom prst="roundRect">
             <a:avLst/>
           </a:prstGeom>
+          <a:solidFill>
+            <a:schemeClr val="tx2"/>
+          </a:solidFill>
         </p:spPr>
         <p:style>
           <a:lnRef idx="2">
@@ -6524,14 +6527,14 @@
             <a:pPr algn="ctr"/>
             <a:r>
               <a:rPr lang="en-US" sz="1200" dirty="0"/>
-              <a:t>PLAN: Process Plan</a:t>
+              <a:t>PLAN: </a:t>
             </a:r>
           </a:p>
           <a:p>
             <a:pPr algn="ctr"/>
             <a:r>
               <a:rPr lang="en-US" sz="1200" dirty="0"/>
-              <a:t>[Safety Program Plan]</a:t>
+              <a:t>Safety Program Plan</a:t>
             </a:r>
           </a:p>
         </p:txBody>

</xml_diff>